<commit_message>
Latest version of diagrams for final report.
</commit_message>
<xml_diff>
--- a/doc/diagrams/Diagrams.pptx
+++ b/doc/diagrams/Diagrams.pptx
@@ -3241,14 +3241,7 @@
                 <a:latin typeface="Tw Cen MT"/>
                 <a:cs typeface="Tw Cen MT"/>
               </a:rPr>
-              <a:t>    </a:t>
-            </a:r>
-            <a:r>
-              <a:rPr lang="en-US" sz="1200" b="1" dirty="0" smtClean="0">
-                <a:latin typeface="Tw Cen MT"/>
-                <a:cs typeface="Tw Cen MT"/>
-              </a:rPr>
-              <a:t>S</a:t>
+              <a:t>    S</a:t>
             </a:r>
             <a:r>
               <a:rPr lang="en-US" sz="1200" b="1" baseline="-25000" dirty="0" smtClean="0">
@@ -4604,7 +4597,7 @@
         </p:nvSpPr>
         <p:spPr>
           <a:xfrm>
-            <a:off x="4538129" y="5056829"/>
+            <a:off x="3532535" y="5140241"/>
             <a:ext cx="361957" cy="260128"/>
           </a:xfrm>
           <a:prstGeom prst="rect">
@@ -4668,7 +4661,7 @@
         </p:nvSpPr>
         <p:spPr>
           <a:xfrm>
-            <a:off x="3520553" y="5373283"/>
+            <a:off x="1374280" y="5435843"/>
             <a:ext cx="361957" cy="260128"/>
           </a:xfrm>
           <a:prstGeom prst="rect">
@@ -4775,48 +4768,8 @@
         </p:nvCxnSpPr>
         <p:spPr>
           <a:xfrm rot="16200000" flipH="1">
-            <a:off x="3179566" y="3828330"/>
-            <a:ext cx="538008" cy="2179117"/>
-          </a:xfrm>
-          <a:prstGeom prst="bentConnector2">
-            <a:avLst/>
-          </a:prstGeom>
-          <a:ln w="12700" cmpd="sng">
-            <a:solidFill>
-              <a:srgbClr val="000000"/>
-            </a:solidFill>
-            <a:headEnd type="none"/>
-            <a:tailEnd type="triangle"/>
-          </a:ln>
-        </p:spPr>
-        <p:style>
-          <a:lnRef idx="2">
-            <a:schemeClr val="accent1"/>
-          </a:lnRef>
-          <a:fillRef idx="0">
-            <a:schemeClr val="accent1"/>
-          </a:fillRef>
-          <a:effectRef idx="1">
-            <a:schemeClr val="accent1"/>
-          </a:effectRef>
-          <a:fontRef idx="minor">
-            <a:schemeClr val="tx1"/>
-          </a:fontRef>
-        </p:style>
-      </p:cxnSp>
-      <p:cxnSp>
-        <p:nvCxnSpPr>
-          <p:cNvPr id="105" name="Elbow Connector 104"/>
-          <p:cNvCxnSpPr>
-            <a:stCxn id="87" idx="4"/>
-            <a:endCxn id="102" idx="1"/>
-          </p:cNvCxnSpPr>
-          <p:nvPr/>
-        </p:nvCxnSpPr>
-        <p:spPr>
-          <a:xfrm rot="16200000" flipH="1">
-            <a:off x="2512551" y="4495345"/>
-            <a:ext cx="854462" cy="1161541"/>
+            <a:off x="2635063" y="4372833"/>
+            <a:ext cx="621420" cy="1173523"/>
           </a:xfrm>
           <a:prstGeom prst="bentConnector2">
             <a:avLst/>
@@ -4958,8 +4911,8 @@
         </p:nvCxnSpPr>
         <p:spPr>
           <a:xfrm>
-            <a:off x="4900086" y="5186893"/>
-            <a:ext cx="1935542" cy="0"/>
+            <a:off x="3894492" y="5270305"/>
+            <a:ext cx="2941136" cy="0"/>
           </a:xfrm>
           <a:prstGeom prst="straightConnector1">
             <a:avLst/>
@@ -4991,24 +4944,26 @@
       <p:cxnSp>
         <p:nvCxnSpPr>
           <p:cNvPr id="109" name="Straight Arrow Connector 108"/>
-          <p:cNvCxnSpPr/>
+          <p:cNvCxnSpPr>
+            <a:stCxn id="102" idx="3"/>
+          </p:cNvCxnSpPr>
           <p:nvPr/>
         </p:nvCxnSpPr>
         <p:spPr>
           <a:xfrm>
-            <a:off x="3882510" y="5503347"/>
-            <a:ext cx="2953118" cy="0"/>
+            <a:off x="1736237" y="5565907"/>
+            <a:ext cx="622774" cy="0"/>
           </a:xfrm>
           <a:prstGeom prst="straightConnector1">
             <a:avLst/>
           </a:prstGeom>
-          <a:ln w="12700" cmpd="sng">
+          <a:ln w="12700" cap="sq" cmpd="sng">
             <a:solidFill>
               <a:srgbClr val="000000"/>
             </a:solidFill>
             <a:prstDash val="dash"/>
             <a:headEnd type="none"/>
-            <a:tailEnd type="triangle"/>
+            <a:tailEnd type="diamond" w="lg" len="med"/>
           </a:ln>
         </p:spPr>
         <p:style>

</xml_diff>